<commit_message>
Actualización README y script data_processing
</commit_message>
<xml_diff>
--- a/docs/Proyecto ML - Negocio v1.pptx
+++ b/docs/Proyecto ML - Negocio v1.pptx
@@ -155,7 +155,7 @@
         <p:txBody>
           <a:bodyPr/>
           <a:p>
-            <a:fld id="{0B6A644E-D386-4A70-852C-6A0B20B3CA95}" type="slidenum">
+            <a:fld id="{8EEB2F70-9F72-4358-9FE1-35065EBC04FF}" type="slidenum">
               <a:t>&lt;#&gt;</a:t>
             </a:fld>
           </a:p>
@@ -325,7 +325,7 @@
         <p:txBody>
           <a:bodyPr/>
           <a:p>
-            <a:fld id="{00E9620A-967F-4B47-8D5D-D8A8A3228AB3}" type="slidenum">
+            <a:fld id="{10FD1B6A-56CD-423E-A8E9-300B1F5F8BF6}" type="slidenum">
               <a:t>&lt;#&gt;</a:t>
             </a:fld>
           </a:p>
@@ -495,7 +495,7 @@
         <p:txBody>
           <a:bodyPr/>
           <a:p>
-            <a:fld id="{46FA2CFA-A2F5-49C1-B3E8-5C0579D35993}" type="slidenum">
+            <a:fld id="{352221DF-DEA1-4798-8D22-AB4BF3FB233A}" type="slidenum">
               <a:t>&lt;#&gt;</a:t>
             </a:fld>
           </a:p>
@@ -665,7 +665,7 @@
         <p:txBody>
           <a:bodyPr/>
           <a:p>
-            <a:fld id="{788DA54E-BBE4-4E71-9C57-C104D900081A}" type="slidenum">
+            <a:fld id="{CCBB0BFD-1A75-4B40-9821-CCB05804CE71}" type="slidenum">
               <a:t>&lt;#&gt;</a:t>
             </a:fld>
           </a:p>
@@ -835,7 +835,7 @@
         <p:txBody>
           <a:bodyPr/>
           <a:p>
-            <a:fld id="{8D92AE2A-22DF-482F-B6DA-915183422E03}" type="slidenum">
+            <a:fld id="{84A1AFF4-55A4-44F1-B7D8-88CA38DC6A2D}" type="slidenum">
               <a:t>&lt;#&gt;</a:t>
             </a:fld>
           </a:p>
@@ -1291,7 +1291,7 @@
                 <a:uFillTx/>
                 <a:latin typeface="DejaVu Sans"/>
               </a:rPr>
-              <a:t> </a:t>
+              <a:t>&lt;fecha/hora&gt;</a:t>
             </a:r>
             <a:endParaRPr b="0" lang="es-ES" sz="1400" strike="noStrike" u="none">
               <a:solidFill>
@@ -1357,7 +1357,7 @@
                 <a:uFillTx/>
                 <a:latin typeface="DejaVu Sans"/>
               </a:rPr>
-              <a:t> </a:t>
+              <a:t>&lt;pie de página&gt;</a:t>
             </a:r>
             <a:endParaRPr b="0" lang="es-ES" sz="1400" strike="noStrike" u="none">
               <a:solidFill>
@@ -1414,7 +1414,7 @@
             <a:pPr indent="0" algn="r">
               <a:buNone/>
             </a:pPr>
-            <a:fld id="{109B28AC-5C29-4B47-8412-2D5774E3CF10}" type="slidenum">
+            <a:fld id="{326ED63C-E424-4E0A-BB2F-E2ACB18CB9A0}" type="slidenum">
               <a:rPr b="0" lang="es-ES" sz="1400" strike="noStrike" u="none">
                 <a:solidFill>
                   <a:srgbClr val="dddddd"/>
@@ -1423,7 +1423,7 @@
                 <a:uFillTx/>
                 <a:latin typeface="DejaVu Sans"/>
               </a:rPr>
-              <a:t>5</a:t>
+              <a:t>&lt;número&gt;</a:t>
             </a:fld>
             <a:endParaRPr b="0" lang="es-ES" sz="1400" strike="noStrike" u="none">
               <a:solidFill>
@@ -2254,7 +2254,7 @@
             <a:pPr indent="0" algn="r">
               <a:buNone/>
             </a:pPr>
-            <a:fld id="{5D3C72C8-06D8-46AB-9088-E7A87CB706B7}" type="slidenum">
+            <a:fld id="{485300DC-573A-4ACC-92CB-B12D2B10C68D}" type="slidenum">
               <a:rPr b="0" lang="es-ES" sz="1400" strike="noStrike" u="none">
                 <a:solidFill>
                   <a:srgbClr val="dddddd"/>
@@ -3441,7 +3441,7 @@
             <a:pPr indent="0" algn="r">
               <a:buNone/>
             </a:pPr>
-            <a:fld id="{22790748-22E1-4DA6-AE55-8DCC4AC4C389}" type="slidenum">
+            <a:fld id="{E5C38676-7F71-450B-A599-C7BE46883091}" type="slidenum">
               <a:rPr b="0" lang="es-ES" sz="1400" strike="noStrike" u="none">
                 <a:solidFill>
                   <a:srgbClr val="dddddd"/>
@@ -3893,7 +3893,7 @@
             <a:pPr indent="0" algn="r">
               <a:buNone/>
             </a:pPr>
-            <a:fld id="{41216226-F6AD-43A2-9A43-68E543B79B97}" type="slidenum">
+            <a:fld id="{12DA14C3-DCB6-4BB5-BAE5-E9F82F70F545}" type="slidenum">
               <a:rPr b="0" lang="es-ES" sz="1400" strike="noStrike" u="none">
                 <a:solidFill>
                   <a:srgbClr val="dddddd"/>
@@ -4677,7 +4677,7 @@
         <p:txBody>
           <a:bodyPr/>
           <a:p>
-            <a:fld id="{86D6897F-8E2B-487F-A817-E9E99832B1D2}" type="slidenum">
+            <a:fld id="{CCD96087-F074-43FF-A265-B1849C142274}" type="slidenum">
               <a:t>2</a:t>
             </a:fld>
           </a:p>
@@ -5095,7 +5095,7 @@
         <p:txBody>
           <a:bodyPr/>
           <a:p>
-            <a:fld id="{55255CA0-AC20-4617-B7F5-BED8A56B2E9E}" type="slidenum">
+            <a:fld id="{56A513D5-DF7C-4F28-8F06-FEE80BC3F3A1}" type="slidenum">
               <a:t>3</a:t>
             </a:fld>
           </a:p>
@@ -5417,7 +5417,7 @@
         <p:txBody>
           <a:bodyPr/>
           <a:p>
-            <a:fld id="{67ACC7B9-0D4C-4F65-84F2-FEC80DCF3DA9}" type="slidenum">
+            <a:fld id="{B79907C1-BE30-433D-BE68-BEF65C738977}" type="slidenum">
               <a:t>4</a:t>
             </a:fld>
           </a:p>
@@ -5656,7 +5656,7 @@
         <p:txBody>
           <a:bodyPr/>
           <a:p>
-            <a:fld id="{F57C8974-D9F3-49B8-B22C-8B3FE349B9B7}" type="slidenum">
+            <a:fld id="{C9BC3986-3544-4485-937C-EF25D5CF65B0}" type="slidenum">
               <a:t>5</a:t>
             </a:fld>
           </a:p>
@@ -5765,7 +5765,7 @@
         <p:txBody>
           <a:bodyPr/>
           <a:p>
-            <a:fld id="{EA3B51D0-2EA2-4B33-9527-5AA49B0AF4B8}" type="slidenum">
+            <a:fld id="{0A96343B-BD90-45A1-8689-A9041C94ABC3}" type="slidenum">
               <a:t>6</a:t>
             </a:fld>
           </a:p>

</xml_diff>